<commit_message>
Added images and video of finished hardware product
</commit_message>
<xml_diff>
--- a/DESIGN AND IMPLEMENTATION OF A WEB-BASED SMART RFID.pptx
+++ b/DESIGN AND IMPLEMENTATION OF A WEB-BASED SMART RFID.pptx
@@ -195,7 +195,7 @@
           <a:noFill/>
           <a:extLst>
             <a:ext uri="{909E8E84-426E-40dd-AFC4-6F175D3DCCD1}">
-              <a14:hiddenFill xmlns="" xmlns:a14="http://schemas.microsoft.com/office/drawing/2010/main">
+              <a14:hiddenFill xmlns:a14="http://schemas.microsoft.com/office/drawing/2010/main" xmlns="">
                 <a:solidFill>
                   <a:srgbClr val="FFFFFF"/>
                 </a:solidFill>
@@ -255,7 +255,7 @@
             </a:ln>
             <a:extLst>
               <a:ext uri="{91240B29-F687-4f45-9708-019B960494DF}">
-                <a14:hiddenLine xmlns="" xmlns:a14="http://schemas.microsoft.com/office/drawing/2010/main" w="9525">
+                <a14:hiddenLine xmlns:a14="http://schemas.microsoft.com/office/drawing/2010/main" xmlns="" w="9525">
                   <a:solidFill>
                     <a:srgbClr val="000000"/>
                   </a:solidFill>
@@ -345,7 +345,7 @@
             </a:ln>
             <a:extLst>
               <a:ext uri="{91240B29-F687-4f45-9708-019B960494DF}">
-                <a14:hiddenLine xmlns="" xmlns:a14="http://schemas.microsoft.com/office/drawing/2010/main" w="9525">
+                <a14:hiddenLine xmlns:a14="http://schemas.microsoft.com/office/drawing/2010/main" xmlns="" w="9525">
                   <a:solidFill>
                     <a:srgbClr val="000000"/>
                   </a:solidFill>
@@ -435,7 +435,7 @@
             </a:ln>
             <a:extLst>
               <a:ext uri="{91240B29-F687-4f45-9708-019B960494DF}">
-                <a14:hiddenLine xmlns="" xmlns:a14="http://schemas.microsoft.com/office/drawing/2010/main" w="9525">
+                <a14:hiddenLine xmlns:a14="http://schemas.microsoft.com/office/drawing/2010/main" xmlns="" w="9525">
                   <a:solidFill>
                     <a:srgbClr val="000000"/>
                   </a:solidFill>
@@ -469,7 +469,7 @@
             </a:ln>
             <a:extLst>
               <a:ext uri="{91240B29-F687-4f45-9708-019B960494DF}">
-                <a14:hiddenLine xmlns="" xmlns:a14="http://schemas.microsoft.com/office/drawing/2010/main" w="9525">
+                <a14:hiddenLine xmlns:a14="http://schemas.microsoft.com/office/drawing/2010/main" xmlns="" w="9525">
                   <a:solidFill>
                     <a:srgbClr val="000000"/>
                   </a:solidFill>
@@ -559,7 +559,7 @@
             </a:ln>
             <a:extLst>
               <a:ext uri="{91240B29-F687-4f45-9708-019B960494DF}">
-                <a14:hiddenLine xmlns="" xmlns:a14="http://schemas.microsoft.com/office/drawing/2010/main" w="9525">
+                <a14:hiddenLine xmlns:a14="http://schemas.microsoft.com/office/drawing/2010/main" xmlns="" w="9525">
                   <a:solidFill>
                     <a:srgbClr val="000000"/>
                   </a:solidFill>
@@ -621,7 +621,7 @@
             </a:ln>
             <a:extLst>
               <a:ext uri="{91240B29-F687-4f45-9708-019B960494DF}">
-                <a14:hiddenLine xmlns="" xmlns:a14="http://schemas.microsoft.com/office/drawing/2010/main" w="9525">
+                <a14:hiddenLine xmlns:a14="http://schemas.microsoft.com/office/drawing/2010/main" xmlns="" w="9525">
                   <a:solidFill>
                     <a:srgbClr val="000000"/>
                   </a:solidFill>
@@ -683,7 +683,7 @@
             </a:ln>
             <a:extLst>
               <a:ext uri="{91240B29-F687-4f45-9708-019B960494DF}">
-                <a14:hiddenLine xmlns="" xmlns:a14="http://schemas.microsoft.com/office/drawing/2010/main" w="9525">
+                <a14:hiddenLine xmlns:a14="http://schemas.microsoft.com/office/drawing/2010/main" xmlns="" w="9525">
                   <a:solidFill>
                     <a:srgbClr val="000000"/>
                   </a:solidFill>
@@ -773,7 +773,7 @@
             </a:ln>
             <a:extLst>
               <a:ext uri="{91240B29-F687-4f45-9708-019B960494DF}">
-                <a14:hiddenLine xmlns="" xmlns:a14="http://schemas.microsoft.com/office/drawing/2010/main" w="9525">
+                <a14:hiddenLine xmlns:a14="http://schemas.microsoft.com/office/drawing/2010/main" xmlns="" w="9525">
                   <a:solidFill>
                     <a:srgbClr val="000000"/>
                   </a:solidFill>
@@ -835,7 +835,7 @@
             </a:ln>
             <a:extLst>
               <a:ext uri="{91240B29-F687-4f45-9708-019B960494DF}">
-                <a14:hiddenLine xmlns="" xmlns:a14="http://schemas.microsoft.com/office/drawing/2010/main" w="9525">
+                <a14:hiddenLine xmlns:a14="http://schemas.microsoft.com/office/drawing/2010/main" xmlns="" w="9525">
                   <a:solidFill>
                     <a:srgbClr val="000000"/>
                   </a:solidFill>
@@ -897,7 +897,7 @@
             </a:ln>
             <a:extLst>
               <a:ext uri="{91240B29-F687-4f45-9708-019B960494DF}">
-                <a14:hiddenLine xmlns="" xmlns:a14="http://schemas.microsoft.com/office/drawing/2010/main" w="9525">
+                <a14:hiddenLine xmlns:a14="http://schemas.microsoft.com/office/drawing/2010/main" xmlns="" w="9525">
                   <a:solidFill>
                     <a:srgbClr val="000000"/>
                   </a:solidFill>
@@ -987,7 +987,7 @@
             </a:ln>
             <a:extLst>
               <a:ext uri="{91240B29-F687-4f45-9708-019B960494DF}">
-                <a14:hiddenLine xmlns="" xmlns:a14="http://schemas.microsoft.com/office/drawing/2010/main" w="9525">
+                <a14:hiddenLine xmlns:a14="http://schemas.microsoft.com/office/drawing/2010/main" xmlns="" w="9525">
                   <a:solidFill>
                     <a:srgbClr val="000000"/>
                   </a:solidFill>
@@ -1077,7 +1077,7 @@
             </a:ln>
             <a:extLst>
               <a:ext uri="{91240B29-F687-4f45-9708-019B960494DF}">
-                <a14:hiddenLine xmlns="" xmlns:a14="http://schemas.microsoft.com/office/drawing/2010/main" w="9525">
+                <a14:hiddenLine xmlns:a14="http://schemas.microsoft.com/office/drawing/2010/main" xmlns="" w="9525">
                   <a:solidFill>
                     <a:srgbClr val="000000"/>
                   </a:solidFill>
@@ -1139,7 +1139,7 @@
             </a:ln>
             <a:extLst>
               <a:ext uri="{91240B29-F687-4f45-9708-019B960494DF}">
-                <a14:hiddenLine xmlns="" xmlns:a14="http://schemas.microsoft.com/office/drawing/2010/main" w="9525">
+                <a14:hiddenLine xmlns:a14="http://schemas.microsoft.com/office/drawing/2010/main" xmlns="" w="9525">
                   <a:solidFill>
                     <a:srgbClr val="000000"/>
                   </a:solidFill>
@@ -1249,7 +1249,7 @@
             </a:ln>
             <a:extLst>
               <a:ext uri="{91240B29-F687-4f45-9708-019B960494DF}">
-                <a14:hiddenLine xmlns="" xmlns:a14="http://schemas.microsoft.com/office/drawing/2010/main" w="9525">
+                <a14:hiddenLine xmlns:a14="http://schemas.microsoft.com/office/drawing/2010/main" xmlns="" w="9525">
                   <a:solidFill>
                     <a:srgbClr val="000000"/>
                   </a:solidFill>
@@ -1311,7 +1311,7 @@
             </a:ln>
             <a:extLst>
               <a:ext uri="{91240B29-F687-4f45-9708-019B960494DF}">
-                <a14:hiddenLine xmlns="" xmlns:a14="http://schemas.microsoft.com/office/drawing/2010/main" w="9525">
+                <a14:hiddenLine xmlns:a14="http://schemas.microsoft.com/office/drawing/2010/main" xmlns="" w="9525">
                   <a:solidFill>
                     <a:srgbClr val="000000"/>
                   </a:solidFill>
@@ -1401,7 +1401,7 @@
             </a:ln>
             <a:extLst>
               <a:ext uri="{91240B29-F687-4f45-9708-019B960494DF}">
-                <a14:hiddenLine xmlns="" xmlns:a14="http://schemas.microsoft.com/office/drawing/2010/main" w="9525">
+                <a14:hiddenLine xmlns:a14="http://schemas.microsoft.com/office/drawing/2010/main" xmlns="" w="9525">
                   <a:solidFill>
                     <a:srgbClr val="000000"/>
                   </a:solidFill>
@@ -1491,7 +1491,7 @@
             </a:ln>
             <a:extLst>
               <a:ext uri="{91240B29-F687-4f45-9708-019B960494DF}">
-                <a14:hiddenLine xmlns="" xmlns:a14="http://schemas.microsoft.com/office/drawing/2010/main" w="9525">
+                <a14:hiddenLine xmlns:a14="http://schemas.microsoft.com/office/drawing/2010/main" xmlns="" w="9525">
                   <a:solidFill>
                     <a:srgbClr val="000000"/>
                   </a:solidFill>
@@ -1553,7 +1553,7 @@
             </a:ln>
             <a:extLst>
               <a:ext uri="{91240B29-F687-4f45-9708-019B960494DF}">
-                <a14:hiddenLine xmlns="" xmlns:a14="http://schemas.microsoft.com/office/drawing/2010/main" w="9525">
+                <a14:hiddenLine xmlns:a14="http://schemas.microsoft.com/office/drawing/2010/main" xmlns="" w="9525">
                   <a:solidFill>
                     <a:srgbClr val="000000"/>
                   </a:solidFill>
@@ -1643,7 +1643,7 @@
             </a:ln>
             <a:extLst>
               <a:ext uri="{91240B29-F687-4f45-9708-019B960494DF}">
-                <a14:hiddenLine xmlns="" xmlns:a14="http://schemas.microsoft.com/office/drawing/2010/main" w="9525">
+                <a14:hiddenLine xmlns:a14="http://schemas.microsoft.com/office/drawing/2010/main" xmlns="" w="9525">
                   <a:solidFill>
                     <a:srgbClr val="000000"/>
                   </a:solidFill>
@@ -1733,7 +1733,7 @@
             </a:ln>
             <a:extLst>
               <a:ext uri="{91240B29-F687-4f45-9708-019B960494DF}">
-                <a14:hiddenLine xmlns="" xmlns:a14="http://schemas.microsoft.com/office/drawing/2010/main" w="9525">
+                <a14:hiddenLine xmlns:a14="http://schemas.microsoft.com/office/drawing/2010/main" xmlns="" w="9525">
                   <a:solidFill>
                     <a:srgbClr val="000000"/>
                   </a:solidFill>
@@ -1789,7 +1789,7 @@
             </a:ln>
             <a:extLst>
               <a:ext uri="{91240B29-F687-4f45-9708-019B960494DF}">
-                <a14:hiddenLine xmlns="" xmlns:a14="http://schemas.microsoft.com/office/drawing/2010/main" w="9525">
+                <a14:hiddenLine xmlns:a14="http://schemas.microsoft.com/office/drawing/2010/main" xmlns="" w="9525">
                   <a:solidFill>
                     <a:srgbClr val="000000"/>
                   </a:solidFill>
@@ -1879,7 +1879,7 @@
             </a:ln>
             <a:extLst>
               <a:ext uri="{91240B29-F687-4f45-9708-019B960494DF}">
-                <a14:hiddenLine xmlns="" xmlns:a14="http://schemas.microsoft.com/office/drawing/2010/main" w="9525">
+                <a14:hiddenLine xmlns:a14="http://schemas.microsoft.com/office/drawing/2010/main" xmlns="" w="9525">
                   <a:solidFill>
                     <a:srgbClr val="000000"/>
                   </a:solidFill>
@@ -1935,7 +1935,7 @@
             </a:ln>
             <a:extLst>
               <a:ext uri="{91240B29-F687-4f45-9708-019B960494DF}">
-                <a14:hiddenLine xmlns="" xmlns:a14="http://schemas.microsoft.com/office/drawing/2010/main" w="9525">
+                <a14:hiddenLine xmlns:a14="http://schemas.microsoft.com/office/drawing/2010/main" xmlns="" w="9525">
                   <a:solidFill>
                     <a:srgbClr val="000000"/>
                   </a:solidFill>
@@ -2025,7 +2025,7 @@
             </a:ln>
             <a:extLst>
               <a:ext uri="{91240B29-F687-4f45-9708-019B960494DF}">
-                <a14:hiddenLine xmlns="" xmlns:a14="http://schemas.microsoft.com/office/drawing/2010/main" w="9525">
+                <a14:hiddenLine xmlns:a14="http://schemas.microsoft.com/office/drawing/2010/main" xmlns="" w="9525">
                   <a:solidFill>
                     <a:srgbClr val="000000"/>
                   </a:solidFill>
@@ -2093,7 +2093,7 @@
             </a:ln>
             <a:extLst>
               <a:ext uri="{91240B29-F687-4f45-9708-019B960494DF}">
-                <a14:hiddenLine xmlns="" xmlns:a14="http://schemas.microsoft.com/office/drawing/2010/main" w="9525">
+                <a14:hiddenLine xmlns:a14="http://schemas.microsoft.com/office/drawing/2010/main" xmlns="" w="9525">
                   <a:solidFill>
                     <a:srgbClr val="000000"/>
                   </a:solidFill>
@@ -2183,7 +2183,7 @@
             </a:ln>
             <a:extLst>
               <a:ext uri="{91240B29-F687-4f45-9708-019B960494DF}">
-                <a14:hiddenLine xmlns="" xmlns:a14="http://schemas.microsoft.com/office/drawing/2010/main" w="9525">
+                <a14:hiddenLine xmlns:a14="http://schemas.microsoft.com/office/drawing/2010/main" xmlns="" w="9525">
                   <a:solidFill>
                     <a:srgbClr val="000000"/>
                   </a:solidFill>
@@ -2251,7 +2251,7 @@
             </a:ln>
             <a:extLst>
               <a:ext uri="{91240B29-F687-4f45-9708-019B960494DF}">
-                <a14:hiddenLine xmlns="" xmlns:a14="http://schemas.microsoft.com/office/drawing/2010/main" w="9525">
+                <a14:hiddenLine xmlns:a14="http://schemas.microsoft.com/office/drawing/2010/main" xmlns="" w="9525">
                   <a:solidFill>
                     <a:srgbClr val="000000"/>
                   </a:solidFill>
@@ -2341,7 +2341,7 @@
             </a:ln>
             <a:extLst>
               <a:ext uri="{91240B29-F687-4f45-9708-019B960494DF}">
-                <a14:hiddenLine xmlns="" xmlns:a14="http://schemas.microsoft.com/office/drawing/2010/main" w="9525">
+                <a14:hiddenLine xmlns:a14="http://schemas.microsoft.com/office/drawing/2010/main" xmlns="" w="9525">
                   <a:solidFill>
                     <a:srgbClr val="000000"/>
                   </a:solidFill>
@@ -2375,7 +2375,7 @@
             </a:ln>
             <a:extLst>
               <a:ext uri="{91240B29-F687-4f45-9708-019B960494DF}">
-                <a14:hiddenLine xmlns="" xmlns:a14="http://schemas.microsoft.com/office/drawing/2010/main" w="9525">
+                <a14:hiddenLine xmlns:a14="http://schemas.microsoft.com/office/drawing/2010/main" xmlns="" w="9525">
                   <a:solidFill>
                     <a:srgbClr val="000000"/>
                   </a:solidFill>
@@ -2465,7 +2465,7 @@
             </a:ln>
             <a:extLst>
               <a:ext uri="{91240B29-F687-4f45-9708-019B960494DF}">
-                <a14:hiddenLine xmlns="" xmlns:a14="http://schemas.microsoft.com/office/drawing/2010/main" w="9525">
+                <a14:hiddenLine xmlns:a14="http://schemas.microsoft.com/office/drawing/2010/main" xmlns="" w="9525">
                   <a:solidFill>
                     <a:srgbClr val="000000"/>
                   </a:solidFill>
@@ -2527,7 +2527,7 @@
             </a:ln>
             <a:extLst>
               <a:ext uri="{91240B29-F687-4f45-9708-019B960494DF}">
-                <a14:hiddenLine xmlns="" xmlns:a14="http://schemas.microsoft.com/office/drawing/2010/main" w="9525">
+                <a14:hiddenLine xmlns:a14="http://schemas.microsoft.com/office/drawing/2010/main" xmlns="" w="9525">
                   <a:solidFill>
                     <a:srgbClr val="000000"/>
                   </a:solidFill>
@@ -2589,7 +2589,7 @@
             </a:ln>
             <a:extLst>
               <a:ext uri="{91240B29-F687-4f45-9708-019B960494DF}">
-                <a14:hiddenLine xmlns="" xmlns:a14="http://schemas.microsoft.com/office/drawing/2010/main" w="9525">
+                <a14:hiddenLine xmlns:a14="http://schemas.microsoft.com/office/drawing/2010/main" xmlns="" w="9525">
                   <a:solidFill>
                     <a:srgbClr val="000000"/>
                   </a:solidFill>
@@ -2679,7 +2679,7 @@
             </a:ln>
             <a:extLst>
               <a:ext uri="{91240B29-F687-4f45-9708-019B960494DF}">
-                <a14:hiddenLine xmlns="" xmlns:a14="http://schemas.microsoft.com/office/drawing/2010/main" w="9525">
+                <a14:hiddenLine xmlns:a14="http://schemas.microsoft.com/office/drawing/2010/main" xmlns="" w="9525">
                   <a:solidFill>
                     <a:srgbClr val="000000"/>
                   </a:solidFill>
@@ -2747,7 +2747,7 @@
             </a:ln>
             <a:extLst>
               <a:ext uri="{91240B29-F687-4f45-9708-019B960494DF}">
-                <a14:hiddenLine xmlns="" xmlns:a14="http://schemas.microsoft.com/office/drawing/2010/main" w="9525">
+                <a14:hiddenLine xmlns:a14="http://schemas.microsoft.com/office/drawing/2010/main" xmlns="" w="9525">
                   <a:solidFill>
                     <a:srgbClr val="000000"/>
                   </a:solidFill>
@@ -2809,7 +2809,7 @@
             </a:ln>
             <a:extLst>
               <a:ext uri="{91240B29-F687-4f45-9708-019B960494DF}">
-                <a14:hiddenLine xmlns="" xmlns:a14="http://schemas.microsoft.com/office/drawing/2010/main" w="9525">
+                <a14:hiddenLine xmlns:a14="http://schemas.microsoft.com/office/drawing/2010/main" xmlns="" w="9525">
                   <a:solidFill>
                     <a:srgbClr val="000000"/>
                   </a:solidFill>
@@ -2899,7 +2899,7 @@
             </a:ln>
             <a:extLst>
               <a:ext uri="{91240B29-F687-4f45-9708-019B960494DF}">
-                <a14:hiddenLine xmlns="" xmlns:a14="http://schemas.microsoft.com/office/drawing/2010/main" w="9525">
+                <a14:hiddenLine xmlns:a14="http://schemas.microsoft.com/office/drawing/2010/main" xmlns="" w="9525">
                   <a:solidFill>
                     <a:srgbClr val="000000"/>
                   </a:solidFill>
@@ -2961,7 +2961,7 @@
             </a:ln>
             <a:extLst>
               <a:ext uri="{91240B29-F687-4f45-9708-019B960494DF}">
-                <a14:hiddenLine xmlns="" xmlns:a14="http://schemas.microsoft.com/office/drawing/2010/main" w="9525">
+                <a14:hiddenLine xmlns:a14="http://schemas.microsoft.com/office/drawing/2010/main" xmlns="" w="9525">
                   <a:solidFill>
                     <a:srgbClr val="000000"/>
                   </a:solidFill>
@@ -3051,7 +3051,7 @@
             </a:ln>
             <a:extLst>
               <a:ext uri="{91240B29-F687-4f45-9708-019B960494DF}">
-                <a14:hiddenLine xmlns="" xmlns:a14="http://schemas.microsoft.com/office/drawing/2010/main" w="9525">
+                <a14:hiddenLine xmlns:a14="http://schemas.microsoft.com/office/drawing/2010/main" xmlns="" w="9525">
                   <a:solidFill>
                     <a:srgbClr val="000000"/>
                   </a:solidFill>
@@ -3113,7 +3113,7 @@
             </a:ln>
             <a:extLst>
               <a:ext uri="{91240B29-F687-4f45-9708-019B960494DF}">
-                <a14:hiddenLine xmlns="" xmlns:a14="http://schemas.microsoft.com/office/drawing/2010/main" w="9525">
+                <a14:hiddenLine xmlns:a14="http://schemas.microsoft.com/office/drawing/2010/main" xmlns="" w="9525">
                   <a:solidFill>
                     <a:srgbClr val="000000"/>
                   </a:solidFill>
@@ -3203,7 +3203,7 @@
             </a:ln>
             <a:extLst>
               <a:ext uri="{91240B29-F687-4f45-9708-019B960494DF}">
-                <a14:hiddenLine xmlns="" xmlns:a14="http://schemas.microsoft.com/office/drawing/2010/main" w="9525">
+                <a14:hiddenLine xmlns:a14="http://schemas.microsoft.com/office/drawing/2010/main" xmlns="" w="9525">
                   <a:solidFill>
                     <a:srgbClr val="000000"/>
                   </a:solidFill>
@@ -3237,7 +3237,7 @@
             </a:ln>
             <a:extLst>
               <a:ext uri="{91240B29-F687-4f45-9708-019B960494DF}">
-                <a14:hiddenLine xmlns="" xmlns:a14="http://schemas.microsoft.com/office/drawing/2010/main" w="9525">
+                <a14:hiddenLine xmlns:a14="http://schemas.microsoft.com/office/drawing/2010/main" xmlns="" w="9525">
                   <a:solidFill>
                     <a:srgbClr val="000000"/>
                   </a:solidFill>
@@ -3302,7 +3302,7 @@
             </a:ln>
             <a:extLst>
               <a:ext uri="{91240B29-F687-4f45-9708-019B960494DF}">
-                <a14:hiddenLine xmlns="" xmlns:a14="http://schemas.microsoft.com/office/drawing/2010/main" w="9525">
+                <a14:hiddenLine xmlns:a14="http://schemas.microsoft.com/office/drawing/2010/main" xmlns="" w="9525">
                   <a:solidFill>
                     <a:srgbClr val="000000"/>
                   </a:solidFill>
@@ -3392,7 +3392,7 @@
             </a:ln>
             <a:extLst>
               <a:ext uri="{91240B29-F687-4f45-9708-019B960494DF}">
-                <a14:hiddenLine xmlns="" xmlns:a14="http://schemas.microsoft.com/office/drawing/2010/main" w="9525">
+                <a14:hiddenLine xmlns:a14="http://schemas.microsoft.com/office/drawing/2010/main" xmlns="" w="9525">
                   <a:solidFill>
                     <a:srgbClr val="000000"/>
                   </a:solidFill>
@@ -3454,7 +3454,7 @@
             </a:ln>
             <a:extLst>
               <a:ext uri="{91240B29-F687-4f45-9708-019B960494DF}">
-                <a14:hiddenLine xmlns="" xmlns:a14="http://schemas.microsoft.com/office/drawing/2010/main" w="9525">
+                <a14:hiddenLine xmlns:a14="http://schemas.microsoft.com/office/drawing/2010/main" xmlns="" w="9525">
                   <a:solidFill>
                     <a:srgbClr val="000000"/>
                   </a:solidFill>
@@ -3544,7 +3544,7 @@
             </a:ln>
             <a:extLst>
               <a:ext uri="{91240B29-F687-4f45-9708-019B960494DF}">
-                <a14:hiddenLine xmlns="" xmlns:a14="http://schemas.microsoft.com/office/drawing/2010/main" w="9525">
+                <a14:hiddenLine xmlns:a14="http://schemas.microsoft.com/office/drawing/2010/main" xmlns="" w="9525">
                   <a:solidFill>
                     <a:srgbClr val="000000"/>
                   </a:solidFill>
@@ -3634,7 +3634,7 @@
             </a:ln>
             <a:extLst>
               <a:ext uri="{91240B29-F687-4f45-9708-019B960494DF}">
-                <a14:hiddenLine xmlns="" xmlns:a14="http://schemas.microsoft.com/office/drawing/2010/main" w="9525">
+                <a14:hiddenLine xmlns:a14="http://schemas.microsoft.com/office/drawing/2010/main" xmlns="" w="9525">
                   <a:solidFill>
                     <a:srgbClr val="000000"/>
                   </a:solidFill>
@@ -3699,7 +3699,7 @@
             </a:ln>
             <a:extLst>
               <a:ext uri="{91240B29-F687-4f45-9708-019B960494DF}">
-                <a14:hiddenLine xmlns="" xmlns:a14="http://schemas.microsoft.com/office/drawing/2010/main" w="9525">
+                <a14:hiddenLine xmlns:a14="http://schemas.microsoft.com/office/drawing/2010/main" xmlns="" w="9525">
                   <a:solidFill>
                     <a:srgbClr val="000000"/>
                   </a:solidFill>
@@ -3761,7 +3761,7 @@
             </a:ln>
             <a:extLst>
               <a:ext uri="{91240B29-F687-4f45-9708-019B960494DF}">
-                <a14:hiddenLine xmlns="" xmlns:a14="http://schemas.microsoft.com/office/drawing/2010/main" w="9525">
+                <a14:hiddenLine xmlns:a14="http://schemas.microsoft.com/office/drawing/2010/main" xmlns="" w="9525">
                   <a:solidFill>
                     <a:srgbClr val="000000"/>
                   </a:solidFill>
@@ -3851,7 +3851,7 @@
             </a:ln>
             <a:extLst>
               <a:ext uri="{91240B29-F687-4f45-9708-019B960494DF}">
-                <a14:hiddenLine xmlns="" xmlns:a14="http://schemas.microsoft.com/office/drawing/2010/main" w="9525">
+                <a14:hiddenLine xmlns:a14="http://schemas.microsoft.com/office/drawing/2010/main" xmlns="" w="9525">
                   <a:solidFill>
                     <a:srgbClr val="000000"/>
                   </a:solidFill>
@@ -3941,7 +3941,7 @@
             </a:ln>
             <a:extLst>
               <a:ext uri="{91240B29-F687-4f45-9708-019B960494DF}">
-                <a14:hiddenLine xmlns="" xmlns:a14="http://schemas.microsoft.com/office/drawing/2010/main" w="9525">
+                <a14:hiddenLine xmlns:a14="http://schemas.microsoft.com/office/drawing/2010/main" xmlns="" w="9525">
                   <a:solidFill>
                     <a:srgbClr val="000000"/>
                   </a:solidFill>
@@ -4003,7 +4003,7 @@
             </a:ln>
             <a:extLst>
               <a:ext uri="{91240B29-F687-4f45-9708-019B960494DF}">
-                <a14:hiddenLine xmlns="" xmlns:a14="http://schemas.microsoft.com/office/drawing/2010/main" w="9525">
+                <a14:hiddenLine xmlns:a14="http://schemas.microsoft.com/office/drawing/2010/main" xmlns="" w="9525">
                   <a:solidFill>
                     <a:srgbClr val="000000"/>
                   </a:solidFill>
@@ -4123,7 +4123,7 @@
             </a:ln>
             <a:extLst>
               <a:ext uri="{91240B29-F687-4f45-9708-019B960494DF}">
-                <a14:hiddenLine xmlns="" xmlns:a14="http://schemas.microsoft.com/office/drawing/2010/main" w="9525">
+                <a14:hiddenLine xmlns:a14="http://schemas.microsoft.com/office/drawing/2010/main" xmlns="" w="9525">
                   <a:solidFill>
                     <a:srgbClr val="000000"/>
                   </a:solidFill>
@@ -4191,7 +4191,7 @@
             </a:ln>
             <a:extLst>
               <a:ext uri="{91240B29-F687-4f45-9708-019B960494DF}">
-                <a14:hiddenLine xmlns="" xmlns:a14="http://schemas.microsoft.com/office/drawing/2010/main" w="9525">
+                <a14:hiddenLine xmlns:a14="http://schemas.microsoft.com/office/drawing/2010/main" xmlns="" w="9525">
                   <a:solidFill>
                     <a:srgbClr val="000000"/>
                   </a:solidFill>
@@ -4281,7 +4281,7 @@
             </a:ln>
             <a:extLst>
               <a:ext uri="{91240B29-F687-4f45-9708-019B960494DF}">
-                <a14:hiddenLine xmlns="" xmlns:a14="http://schemas.microsoft.com/office/drawing/2010/main" w="9525">
+                <a14:hiddenLine xmlns:a14="http://schemas.microsoft.com/office/drawing/2010/main" xmlns="" w="9525">
                   <a:solidFill>
                     <a:srgbClr val="000000"/>
                   </a:solidFill>
@@ -8998,7 +8998,7 @@
           <a:noFill/>
           <a:extLst>
             <a:ext uri="{909E8E84-426E-40dd-AFC4-6F175D3DCCD1}">
-              <a14:hiddenFill xmlns="" xmlns:a14="http://schemas.microsoft.com/office/drawing/2010/main">
+              <a14:hiddenFill xmlns:a14="http://schemas.microsoft.com/office/drawing/2010/main" xmlns="">
                 <a:solidFill>
                   <a:srgbClr val="FFFFFF"/>
                 </a:solidFill>
@@ -9072,7 +9072,7 @@
               </a:ln>
               <a:extLst>
                 <a:ext uri="{91240B29-F687-4f45-9708-019B960494DF}">
-                  <a14:hiddenLine xmlns="" xmlns:a14="http://schemas.microsoft.com/office/drawing/2010/main" w="9525">
+                  <a14:hiddenLine xmlns:a14="http://schemas.microsoft.com/office/drawing/2010/main" xmlns="" w="9525">
                     <a:solidFill>
                       <a:srgbClr val="000000"/>
                     </a:solidFill>
@@ -9162,7 +9162,7 @@
               </a:ln>
               <a:extLst>
                 <a:ext uri="{91240B29-F687-4f45-9708-019B960494DF}">
-                  <a14:hiddenLine xmlns="" xmlns:a14="http://schemas.microsoft.com/office/drawing/2010/main" w="9525">
+                  <a14:hiddenLine xmlns:a14="http://schemas.microsoft.com/office/drawing/2010/main" xmlns="" w="9525">
                     <a:solidFill>
                       <a:srgbClr val="000000"/>
                     </a:solidFill>
@@ -9252,7 +9252,7 @@
               </a:ln>
               <a:extLst>
                 <a:ext uri="{91240B29-F687-4f45-9708-019B960494DF}">
-                  <a14:hiddenLine xmlns="" xmlns:a14="http://schemas.microsoft.com/office/drawing/2010/main" w="9525">
+                  <a14:hiddenLine xmlns:a14="http://schemas.microsoft.com/office/drawing/2010/main" xmlns="" w="9525">
                     <a:solidFill>
                       <a:srgbClr val="000000"/>
                     </a:solidFill>
@@ -9314,7 +9314,7 @@
               </a:ln>
               <a:extLst>
                 <a:ext uri="{91240B29-F687-4f45-9708-019B960494DF}">
-                  <a14:hiddenLine xmlns="" xmlns:a14="http://schemas.microsoft.com/office/drawing/2010/main" w="9525">
+                  <a14:hiddenLine xmlns:a14="http://schemas.microsoft.com/office/drawing/2010/main" xmlns="" w="9525">
                     <a:solidFill>
                       <a:srgbClr val="000000"/>
                     </a:solidFill>
@@ -9404,7 +9404,7 @@
               </a:ln>
               <a:extLst>
                 <a:ext uri="{91240B29-F687-4f45-9708-019B960494DF}">
-                  <a14:hiddenLine xmlns="" xmlns:a14="http://schemas.microsoft.com/office/drawing/2010/main" w="9525">
+                  <a14:hiddenLine xmlns:a14="http://schemas.microsoft.com/office/drawing/2010/main" xmlns="" w="9525">
                     <a:solidFill>
                       <a:srgbClr val="000000"/>
                     </a:solidFill>
@@ -9466,7 +9466,7 @@
               </a:ln>
               <a:extLst>
                 <a:ext uri="{91240B29-F687-4f45-9708-019B960494DF}">
-                  <a14:hiddenLine xmlns="" xmlns:a14="http://schemas.microsoft.com/office/drawing/2010/main" w="9525">
+                  <a14:hiddenLine xmlns:a14="http://schemas.microsoft.com/office/drawing/2010/main" xmlns="" w="9525">
                     <a:solidFill>
                       <a:srgbClr val="000000"/>
                     </a:solidFill>
@@ -9528,7 +9528,7 @@
               </a:ln>
               <a:extLst>
                 <a:ext uri="{91240B29-F687-4f45-9708-019B960494DF}">
-                  <a14:hiddenLine xmlns="" xmlns:a14="http://schemas.microsoft.com/office/drawing/2010/main" w="9525">
+                  <a14:hiddenLine xmlns:a14="http://schemas.microsoft.com/office/drawing/2010/main" xmlns="" w="9525">
                     <a:solidFill>
                       <a:srgbClr val="000000"/>
                     </a:solidFill>
@@ -9618,7 +9618,7 @@
               </a:ln>
               <a:extLst>
                 <a:ext uri="{91240B29-F687-4f45-9708-019B960494DF}">
-                  <a14:hiddenLine xmlns="" xmlns:a14="http://schemas.microsoft.com/office/drawing/2010/main" w="9525">
+                  <a14:hiddenLine xmlns:a14="http://schemas.microsoft.com/office/drawing/2010/main" xmlns="" w="9525">
                     <a:solidFill>
                       <a:srgbClr val="000000"/>
                     </a:solidFill>
@@ -9708,7 +9708,7 @@
               </a:ln>
               <a:extLst>
                 <a:ext uri="{91240B29-F687-4f45-9708-019B960494DF}">
-                  <a14:hiddenLine xmlns="" xmlns:a14="http://schemas.microsoft.com/office/drawing/2010/main" w="9525">
+                  <a14:hiddenLine xmlns:a14="http://schemas.microsoft.com/office/drawing/2010/main" xmlns="" w="9525">
                     <a:solidFill>
                       <a:srgbClr val="000000"/>
                     </a:solidFill>
@@ -9770,7 +9770,7 @@
               </a:ln>
               <a:extLst>
                 <a:ext uri="{91240B29-F687-4f45-9708-019B960494DF}">
-                  <a14:hiddenLine xmlns="" xmlns:a14="http://schemas.microsoft.com/office/drawing/2010/main" w="9525">
+                  <a14:hiddenLine xmlns:a14="http://schemas.microsoft.com/office/drawing/2010/main" xmlns="" w="9525">
                     <a:solidFill>
                       <a:srgbClr val="000000"/>
                     </a:solidFill>
@@ -9880,7 +9880,7 @@
               </a:ln>
               <a:extLst>
                 <a:ext uri="{91240B29-F687-4f45-9708-019B960494DF}">
-                  <a14:hiddenLine xmlns="" xmlns:a14="http://schemas.microsoft.com/office/drawing/2010/main" w="9525">
+                  <a14:hiddenLine xmlns:a14="http://schemas.microsoft.com/office/drawing/2010/main" xmlns="" w="9525">
                     <a:solidFill>
                       <a:srgbClr val="000000"/>
                     </a:solidFill>
@@ -9964,7 +9964,7 @@
               </a:ln>
               <a:extLst>
                 <a:ext uri="{91240B29-F687-4f45-9708-019B960494DF}">
-                  <a14:hiddenLine xmlns="" xmlns:a14="http://schemas.microsoft.com/office/drawing/2010/main" w="9525">
+                  <a14:hiddenLine xmlns:a14="http://schemas.microsoft.com/office/drawing/2010/main" xmlns="" w="9525">
                     <a:solidFill>
                       <a:srgbClr val="000000"/>
                     </a:solidFill>
@@ -10026,7 +10026,7 @@
               </a:ln>
               <a:extLst>
                 <a:ext uri="{91240B29-F687-4f45-9708-019B960494DF}">
-                  <a14:hiddenLine xmlns="" xmlns:a14="http://schemas.microsoft.com/office/drawing/2010/main" w="9525">
+                  <a14:hiddenLine xmlns:a14="http://schemas.microsoft.com/office/drawing/2010/main" xmlns="" w="9525">
                     <a:solidFill>
                       <a:srgbClr val="000000"/>
                     </a:solidFill>
@@ -10088,7 +10088,7 @@
               </a:ln>
               <a:extLst>
                 <a:ext uri="{91240B29-F687-4f45-9708-019B960494DF}">
-                  <a14:hiddenLine xmlns="" xmlns:a14="http://schemas.microsoft.com/office/drawing/2010/main" w="9525">
+                  <a14:hiddenLine xmlns:a14="http://schemas.microsoft.com/office/drawing/2010/main" xmlns="" w="9525">
                     <a:solidFill>
                       <a:srgbClr val="000000"/>
                     </a:solidFill>
@@ -10178,7 +10178,7 @@
               </a:ln>
               <a:extLst>
                 <a:ext uri="{91240B29-F687-4f45-9708-019B960494DF}">
-                  <a14:hiddenLine xmlns="" xmlns:a14="http://schemas.microsoft.com/office/drawing/2010/main" w="9525">
+                  <a14:hiddenLine xmlns:a14="http://schemas.microsoft.com/office/drawing/2010/main" xmlns="" w="9525">
                     <a:solidFill>
                       <a:srgbClr val="000000"/>
                     </a:solidFill>
@@ -10212,7 +10212,7 @@
               </a:ln>
               <a:extLst>
                 <a:ext uri="{91240B29-F687-4f45-9708-019B960494DF}">
-                  <a14:hiddenLine xmlns="" xmlns:a14="http://schemas.microsoft.com/office/drawing/2010/main" w="9525">
+                  <a14:hiddenLine xmlns:a14="http://schemas.microsoft.com/office/drawing/2010/main" xmlns="" w="9525">
                     <a:solidFill>
                       <a:srgbClr val="000000"/>
                     </a:solidFill>
@@ -10277,7 +10277,7 @@
               </a:ln>
               <a:extLst>
                 <a:ext uri="{91240B29-F687-4f45-9708-019B960494DF}">
-                  <a14:hiddenLine xmlns="" xmlns:a14="http://schemas.microsoft.com/office/drawing/2010/main" w="9525">
+                  <a14:hiddenLine xmlns:a14="http://schemas.microsoft.com/office/drawing/2010/main" xmlns="" w="9525">
                     <a:solidFill>
                       <a:srgbClr val="000000"/>
                     </a:solidFill>
@@ -10367,7 +10367,7 @@
               </a:ln>
               <a:extLst>
                 <a:ext uri="{91240B29-F687-4f45-9708-019B960494DF}">
-                  <a14:hiddenLine xmlns="" xmlns:a14="http://schemas.microsoft.com/office/drawing/2010/main" w="9525">
+                  <a14:hiddenLine xmlns:a14="http://schemas.microsoft.com/office/drawing/2010/main" xmlns="" w="9525">
                     <a:solidFill>
                       <a:srgbClr val="000000"/>
                     </a:solidFill>
@@ -10429,7 +10429,7 @@
               </a:ln>
               <a:extLst>
                 <a:ext uri="{91240B29-F687-4f45-9708-019B960494DF}">
-                  <a14:hiddenLine xmlns="" xmlns:a14="http://schemas.microsoft.com/office/drawing/2010/main" w="9525">
+                  <a14:hiddenLine xmlns:a14="http://schemas.microsoft.com/office/drawing/2010/main" xmlns="" w="9525">
                     <a:solidFill>
                       <a:srgbClr val="000000"/>
                     </a:solidFill>
@@ -10519,7 +10519,7 @@
               </a:ln>
               <a:extLst>
                 <a:ext uri="{91240B29-F687-4f45-9708-019B960494DF}">
-                  <a14:hiddenLine xmlns="" xmlns:a14="http://schemas.microsoft.com/office/drawing/2010/main" w="9525">
+                  <a14:hiddenLine xmlns:a14="http://schemas.microsoft.com/office/drawing/2010/main" xmlns="" w="9525">
                     <a:solidFill>
                       <a:srgbClr val="000000"/>
                     </a:solidFill>
@@ -10584,7 +10584,7 @@
               </a:ln>
               <a:extLst>
                 <a:ext uri="{91240B29-F687-4f45-9708-019B960494DF}">
-                  <a14:hiddenLine xmlns="" xmlns:a14="http://schemas.microsoft.com/office/drawing/2010/main" w="9525">
+                  <a14:hiddenLine xmlns:a14="http://schemas.microsoft.com/office/drawing/2010/main" xmlns="" w="9525">
                     <a:solidFill>
                       <a:srgbClr val="000000"/>
                     </a:solidFill>
@@ -10646,7 +10646,7 @@
               </a:ln>
               <a:extLst>
                 <a:ext uri="{91240B29-F687-4f45-9708-019B960494DF}">
-                  <a14:hiddenLine xmlns="" xmlns:a14="http://schemas.microsoft.com/office/drawing/2010/main" w="9525">
+                  <a14:hiddenLine xmlns:a14="http://schemas.microsoft.com/office/drawing/2010/main" xmlns="" w="9525">
                     <a:solidFill>
                       <a:srgbClr val="000000"/>
                     </a:solidFill>
@@ -10736,7 +10736,7 @@
               </a:ln>
               <a:extLst>
                 <a:ext uri="{91240B29-F687-4f45-9708-019B960494DF}">
-                  <a14:hiddenLine xmlns="" xmlns:a14="http://schemas.microsoft.com/office/drawing/2010/main" w="9525">
+                  <a14:hiddenLine xmlns:a14="http://schemas.microsoft.com/office/drawing/2010/main" xmlns="" w="9525">
                     <a:solidFill>
                       <a:srgbClr val="000000"/>
                     </a:solidFill>
@@ -10826,7 +10826,7 @@
               </a:ln>
               <a:extLst>
                 <a:ext uri="{91240B29-F687-4f45-9708-019B960494DF}">
-                  <a14:hiddenLine xmlns="" xmlns:a14="http://schemas.microsoft.com/office/drawing/2010/main" w="9525">
+                  <a14:hiddenLine xmlns:a14="http://schemas.microsoft.com/office/drawing/2010/main" xmlns="" w="9525">
                     <a:solidFill>
                       <a:srgbClr val="000000"/>
                     </a:solidFill>
@@ -10891,7 +10891,7 @@
               </a:ln>
               <a:extLst>
                 <a:ext uri="{91240B29-F687-4f45-9708-019B960494DF}">
-                  <a14:hiddenLine xmlns="" xmlns:a14="http://schemas.microsoft.com/office/drawing/2010/main" w="9525">
+                  <a14:hiddenLine xmlns:a14="http://schemas.microsoft.com/office/drawing/2010/main" xmlns="" w="9525">
                     <a:solidFill>
                       <a:srgbClr val="000000"/>
                     </a:solidFill>
@@ -11011,7 +11011,7 @@
               </a:ln>
               <a:extLst>
                 <a:ext uri="{91240B29-F687-4f45-9708-019B960494DF}">
-                  <a14:hiddenLine xmlns="" xmlns:a14="http://schemas.microsoft.com/office/drawing/2010/main" w="9525">
+                  <a14:hiddenLine xmlns:a14="http://schemas.microsoft.com/office/drawing/2010/main" xmlns="" w="9525">
                     <a:solidFill>
                       <a:srgbClr val="000000"/>
                     </a:solidFill>
@@ -11109,7 +11109,7 @@
               </a:ln>
               <a:extLst>
                 <a:ext uri="{91240B29-F687-4f45-9708-019B960494DF}">
-                  <a14:hiddenLine xmlns="" xmlns:a14="http://schemas.microsoft.com/office/drawing/2010/main" w="9525">
+                  <a14:hiddenLine xmlns:a14="http://schemas.microsoft.com/office/drawing/2010/main" xmlns="" w="9525">
                     <a:solidFill>
                       <a:srgbClr val="000000"/>
                     </a:solidFill>
@@ -11224,7 +11224,7 @@
               </a:ln>
               <a:extLst>
                 <a:ext uri="{91240B29-F687-4f45-9708-019B960494DF}">
-                  <a14:hiddenLine xmlns="" xmlns:a14="http://schemas.microsoft.com/office/drawing/2010/main" w="9525">
+                  <a14:hiddenLine xmlns:a14="http://schemas.microsoft.com/office/drawing/2010/main" xmlns="" w="9525">
                     <a:solidFill>
                       <a:srgbClr val="000000"/>
                     </a:solidFill>
@@ -11314,7 +11314,7 @@
               </a:ln>
               <a:extLst>
                 <a:ext uri="{91240B29-F687-4f45-9708-019B960494DF}">
-                  <a14:hiddenLine xmlns="" xmlns:a14="http://schemas.microsoft.com/office/drawing/2010/main" w="9525">
+                  <a14:hiddenLine xmlns:a14="http://schemas.microsoft.com/office/drawing/2010/main" xmlns="" w="9525">
                     <a:solidFill>
                       <a:srgbClr val="000000"/>
                     </a:solidFill>
@@ -11379,7 +11379,7 @@
               </a:ln>
               <a:extLst>
                 <a:ext uri="{91240B29-F687-4f45-9708-019B960494DF}">
-                  <a14:hiddenLine xmlns="" xmlns:a14="http://schemas.microsoft.com/office/drawing/2010/main" w="9525">
+                  <a14:hiddenLine xmlns:a14="http://schemas.microsoft.com/office/drawing/2010/main" xmlns="" w="9525">
                     <a:solidFill>
                       <a:srgbClr val="000000"/>
                     </a:solidFill>
@@ -11469,7 +11469,7 @@
               </a:ln>
               <a:extLst>
                 <a:ext uri="{91240B29-F687-4f45-9708-019B960494DF}">
-                  <a14:hiddenLine xmlns="" xmlns:a14="http://schemas.microsoft.com/office/drawing/2010/main" w="9525">
+                  <a14:hiddenLine xmlns:a14="http://schemas.microsoft.com/office/drawing/2010/main" xmlns="" w="9525">
                     <a:solidFill>
                       <a:srgbClr val="000000"/>
                     </a:solidFill>
@@ -11537,7 +11537,7 @@
               </a:ln>
               <a:extLst>
                 <a:ext uri="{91240B29-F687-4f45-9708-019B960494DF}">
-                  <a14:hiddenLine xmlns="" xmlns:a14="http://schemas.microsoft.com/office/drawing/2010/main" w="9525">
+                  <a14:hiddenLine xmlns:a14="http://schemas.microsoft.com/office/drawing/2010/main" xmlns="" w="9525">
                     <a:solidFill>
                       <a:srgbClr val="000000"/>
                     </a:solidFill>
@@ -11627,7 +11627,7 @@
               </a:ln>
               <a:extLst>
                 <a:ext uri="{91240B29-F687-4f45-9708-019B960494DF}">
-                  <a14:hiddenLine xmlns="" xmlns:a14="http://schemas.microsoft.com/office/drawing/2010/main" w="9525">
+                  <a14:hiddenLine xmlns:a14="http://schemas.microsoft.com/office/drawing/2010/main" xmlns="" w="9525">
                     <a:solidFill>
                       <a:srgbClr val="000000"/>
                     </a:solidFill>
@@ -11695,7 +11695,7 @@
               </a:ln>
               <a:extLst>
                 <a:ext uri="{91240B29-F687-4f45-9708-019B960494DF}">
-                  <a14:hiddenLine xmlns="" xmlns:a14="http://schemas.microsoft.com/office/drawing/2010/main" w="9525">
+                  <a14:hiddenLine xmlns:a14="http://schemas.microsoft.com/office/drawing/2010/main" xmlns="" w="9525">
                     <a:solidFill>
                       <a:srgbClr val="000000"/>
                     </a:solidFill>
@@ -11785,7 +11785,7 @@
               </a:ln>
               <a:extLst>
                 <a:ext uri="{91240B29-F687-4f45-9708-019B960494DF}">
-                  <a14:hiddenLine xmlns="" xmlns:a14="http://schemas.microsoft.com/office/drawing/2010/main" w="9525">
+                  <a14:hiddenLine xmlns:a14="http://schemas.microsoft.com/office/drawing/2010/main" xmlns="" w="9525">
                     <a:solidFill>
                       <a:srgbClr val="000000"/>
                     </a:solidFill>
@@ -11819,7 +11819,7 @@
               </a:ln>
               <a:extLst>
                 <a:ext uri="{91240B29-F687-4f45-9708-019B960494DF}">
-                  <a14:hiddenLine xmlns="" xmlns:a14="http://schemas.microsoft.com/office/drawing/2010/main" w="9525">
+                  <a14:hiddenLine xmlns:a14="http://schemas.microsoft.com/office/drawing/2010/main" xmlns="" w="9525">
                     <a:solidFill>
                       <a:srgbClr val="000000"/>
                     </a:solidFill>
@@ -13599,7 +13599,15 @@
           <a:p>
             <a:r>
               <a:rPr lang="en-US" dirty="0"/>
-              <a:t>This is an Admin dashboard based site that controls the data the hardware device works with. All data sent by the device is processed, controlled and stored by the site. It also contains the database that holds information about the students and lecturers. It is also the avenue through which lecturers control the hardware device and give it its instructions.</a:t>
+              <a:t>This is a website hosted on an </a:t>
+            </a:r>
+            <a:r>
+              <a:rPr lang="en-US" dirty="0" err="1"/>
+              <a:t>apache</a:t>
+            </a:r>
+            <a:r>
+              <a:rPr lang="en-US" dirty="0"/>
+              <a:t> web server. Built with HTML, CSS, JavaScript, PHP and MySQL.</a:t>
             </a:r>
           </a:p>
         </p:txBody>
@@ -13716,7 +13724,10 @@
           <a:bodyPr/>
           <a:lstStyle/>
           <a:p>
-            <a:endParaRPr lang="en-US" dirty="0"/>
+            <a:r>
+              <a:rPr lang="en-US" dirty="0"/>
+              <a:t>This is a portable hardware device that scans student ID cards, sends their details to a web server and returns a true or false value. It runs on a 9v battery.</a:t>
+            </a:r>
           </a:p>
         </p:txBody>
       </p:sp>
@@ -13961,6 +13972,12 @@
         <p:txBody>
           <a:bodyPr/>
           <a:lstStyle/>
+          <a:p>
+            <a:r>
+              <a:rPr lang="en-US" dirty="0"/>
+              <a:t>This is an Admin dashboard based site that controls the data the hardware device works with. All data sent by the device is processed, controlled and stored by the site. It also contains the database that holds information about the students and lecturers. It is also the avenue through which lecturers control the hardware device and give it its instructions.</a:t>
+            </a:r>
+          </a:p>
           <a:p>
             <a:endParaRPr lang="en-US" dirty="0"/>
           </a:p>

</xml_diff>